<commit_message>
pridany slajd o hranole
</commit_message>
<xml_diff>
--- a/doc/presentation.pptx
+++ b/doc/presentation.pptx
@@ -2,10 +2,10 @@
 <file path=ppt/presentation.xml><?xml version="1.0" encoding="utf-8"?>
 <p:presentation xmlns:a="http://schemas.openxmlformats.org/drawingml/2006/main" xmlns:r="http://schemas.openxmlformats.org/officeDocument/2006/relationships" xmlns:p="http://schemas.openxmlformats.org/presentationml/2006/main" saveSubsetFonts="1">
   <p:sldMasterIdLst>
-    <p:sldMasterId id="2147483648" r:id="rId1"/>
+    <p:sldMasterId id="2147483815" r:id="rId1"/>
   </p:sldMasterIdLst>
   <p:notesMasterIdLst>
-    <p:notesMasterId r:id="rId8"/>
+    <p:notesMasterId r:id="rId9"/>
   </p:notesMasterIdLst>
   <p:sldIdLst>
     <p:sldId id="256" r:id="rId2"/>
@@ -13,7 +13,8 @@
     <p:sldId id="262" r:id="rId4"/>
     <p:sldId id="264" r:id="rId5"/>
     <p:sldId id="258" r:id="rId6"/>
-    <p:sldId id="261" r:id="rId7"/>
+    <p:sldId id="265" r:id="rId7"/>
+    <p:sldId id="261" r:id="rId8"/>
   </p:sldIdLst>
   <p:sldSz cx="12192000" cy="6858000"/>
   <p:notesSz cx="6858000" cy="9144000"/>
@@ -202,7 +203,7 @@
           <a:p>
             <a:fld id="{6239EEF6-372B-463A-925F-9B2FCD2A5BC4}" type="datetimeFigureOut">
               <a:rPr lang="en-US" smtClean="0"/>
-              <a:t>4/17/2015</a:t>
+              <a:t>4/19/2015</a:t>
             </a:fld>
             <a:endParaRPr lang="en-US"/>
           </a:p>
@@ -871,7 +872,7 @@
           <a:p>
             <a:fld id="{AFA22184-DC73-440F-8D46-68408BDE5852}" type="slidenum">
               <a:rPr lang="en-US" smtClean="0"/>
-              <a:t>6</a:t>
+              <a:t>7</a:t>
             </a:fld>
             <a:endParaRPr lang="en-US"/>
           </a:p>
@@ -1021,7 +1022,7 @@
           <a:p>
             <a:fld id="{A84E8D54-BAE0-4E27-8EE0-25F5D7DCDD5A}" type="datetimeFigureOut">
               <a:rPr lang="en-US" smtClean="0"/>
-              <a:t>4/17/2015</a:t>
+              <a:t>4/19/2015</a:t>
             </a:fld>
             <a:endParaRPr lang="en-US"/>
           </a:p>
@@ -1072,7 +1073,7 @@
     </p:spTree>
     <p:extLst>
       <p:ext uri="{BB962C8B-B14F-4D97-AF65-F5344CB8AC3E}">
-        <p14:creationId xmlns:p14="http://schemas.microsoft.com/office/powerpoint/2010/main" val="2782182436"/>
+        <p14:creationId xmlns:p14="http://schemas.microsoft.com/office/powerpoint/2010/main" val="3799033450"/>
       </p:ext>
     </p:extLst>
   </p:cSld>
@@ -1191,7 +1192,7 @@
           <a:p>
             <a:fld id="{A84E8D54-BAE0-4E27-8EE0-25F5D7DCDD5A}" type="datetimeFigureOut">
               <a:rPr lang="en-US" smtClean="0"/>
-              <a:t>4/17/2015</a:t>
+              <a:t>4/19/2015</a:t>
             </a:fld>
             <a:endParaRPr lang="en-US"/>
           </a:p>
@@ -1242,7 +1243,7 @@
     </p:spTree>
     <p:extLst>
       <p:ext uri="{BB962C8B-B14F-4D97-AF65-F5344CB8AC3E}">
-        <p14:creationId xmlns:p14="http://schemas.microsoft.com/office/powerpoint/2010/main" val="3405458628"/>
+        <p14:creationId xmlns:p14="http://schemas.microsoft.com/office/powerpoint/2010/main" val="3147029573"/>
       </p:ext>
     </p:extLst>
   </p:cSld>
@@ -1371,7 +1372,7 @@
           <a:p>
             <a:fld id="{A84E8D54-BAE0-4E27-8EE0-25F5D7DCDD5A}" type="datetimeFigureOut">
               <a:rPr lang="en-US" smtClean="0"/>
-              <a:t>4/17/2015</a:t>
+              <a:t>4/19/2015</a:t>
             </a:fld>
             <a:endParaRPr lang="en-US"/>
           </a:p>
@@ -1422,7 +1423,7 @@
     </p:spTree>
     <p:extLst>
       <p:ext uri="{BB962C8B-B14F-4D97-AF65-F5344CB8AC3E}">
-        <p14:creationId xmlns:p14="http://schemas.microsoft.com/office/powerpoint/2010/main" val="3267897131"/>
+        <p14:creationId xmlns:p14="http://schemas.microsoft.com/office/powerpoint/2010/main" val="514700639"/>
       </p:ext>
     </p:extLst>
   </p:cSld>
@@ -1541,7 +1542,7 @@
           <a:p>
             <a:fld id="{A84E8D54-BAE0-4E27-8EE0-25F5D7DCDD5A}" type="datetimeFigureOut">
               <a:rPr lang="en-US" smtClean="0"/>
-              <a:t>4/17/2015</a:t>
+              <a:t>4/19/2015</a:t>
             </a:fld>
             <a:endParaRPr lang="en-US"/>
           </a:p>
@@ -1592,7 +1593,7 @@
     </p:spTree>
     <p:extLst>
       <p:ext uri="{BB962C8B-B14F-4D97-AF65-F5344CB8AC3E}">
-        <p14:creationId xmlns:p14="http://schemas.microsoft.com/office/powerpoint/2010/main" val="1564673928"/>
+        <p14:creationId xmlns:p14="http://schemas.microsoft.com/office/powerpoint/2010/main" val="1151116088"/>
       </p:ext>
     </p:extLst>
   </p:cSld>
@@ -1787,7 +1788,7 @@
           <a:p>
             <a:fld id="{A84E8D54-BAE0-4E27-8EE0-25F5D7DCDD5A}" type="datetimeFigureOut">
               <a:rPr lang="en-US" smtClean="0"/>
-              <a:t>4/17/2015</a:t>
+              <a:t>4/19/2015</a:t>
             </a:fld>
             <a:endParaRPr lang="en-US"/>
           </a:p>
@@ -1838,7 +1839,7 @@
     </p:spTree>
     <p:extLst>
       <p:ext uri="{BB962C8B-B14F-4D97-AF65-F5344CB8AC3E}">
-        <p14:creationId xmlns:p14="http://schemas.microsoft.com/office/powerpoint/2010/main" val="609241084"/>
+        <p14:creationId xmlns:p14="http://schemas.microsoft.com/office/powerpoint/2010/main" val="966882916"/>
       </p:ext>
     </p:extLst>
   </p:cSld>
@@ -2019,7 +2020,7 @@
           <a:p>
             <a:fld id="{A84E8D54-BAE0-4E27-8EE0-25F5D7DCDD5A}" type="datetimeFigureOut">
               <a:rPr lang="en-US" smtClean="0"/>
-              <a:t>4/17/2015</a:t>
+              <a:t>4/19/2015</a:t>
             </a:fld>
             <a:endParaRPr lang="en-US"/>
           </a:p>
@@ -2070,7 +2071,7 @@
     </p:spTree>
     <p:extLst>
       <p:ext uri="{BB962C8B-B14F-4D97-AF65-F5344CB8AC3E}">
-        <p14:creationId xmlns:p14="http://schemas.microsoft.com/office/powerpoint/2010/main" val="2088497134"/>
+        <p14:creationId xmlns:p14="http://schemas.microsoft.com/office/powerpoint/2010/main" val="3947420974"/>
       </p:ext>
     </p:extLst>
   </p:cSld>
@@ -2386,7 +2387,7 @@
           <a:p>
             <a:fld id="{A84E8D54-BAE0-4E27-8EE0-25F5D7DCDD5A}" type="datetimeFigureOut">
               <a:rPr lang="en-US" smtClean="0"/>
-              <a:t>4/17/2015</a:t>
+              <a:t>4/19/2015</a:t>
             </a:fld>
             <a:endParaRPr lang="en-US"/>
           </a:p>
@@ -2437,7 +2438,7 @@
     </p:spTree>
     <p:extLst>
       <p:ext uri="{BB962C8B-B14F-4D97-AF65-F5344CB8AC3E}">
-        <p14:creationId xmlns:p14="http://schemas.microsoft.com/office/powerpoint/2010/main" val="606197252"/>
+        <p14:creationId xmlns:p14="http://schemas.microsoft.com/office/powerpoint/2010/main" val="2212648365"/>
       </p:ext>
     </p:extLst>
   </p:cSld>
@@ -2504,7 +2505,7 @@
           <a:p>
             <a:fld id="{A84E8D54-BAE0-4E27-8EE0-25F5D7DCDD5A}" type="datetimeFigureOut">
               <a:rPr lang="en-US" smtClean="0"/>
-              <a:t>4/17/2015</a:t>
+              <a:t>4/19/2015</a:t>
             </a:fld>
             <a:endParaRPr lang="en-US"/>
           </a:p>
@@ -2555,7 +2556,7 @@
     </p:spTree>
     <p:extLst>
       <p:ext uri="{BB962C8B-B14F-4D97-AF65-F5344CB8AC3E}">
-        <p14:creationId xmlns:p14="http://schemas.microsoft.com/office/powerpoint/2010/main" val="3725212403"/>
+        <p14:creationId xmlns:p14="http://schemas.microsoft.com/office/powerpoint/2010/main" val="3177129851"/>
       </p:ext>
     </p:extLst>
   </p:cSld>
@@ -2599,7 +2600,7 @@
           <a:p>
             <a:fld id="{A84E8D54-BAE0-4E27-8EE0-25F5D7DCDD5A}" type="datetimeFigureOut">
               <a:rPr lang="en-US" smtClean="0"/>
-              <a:t>4/17/2015</a:t>
+              <a:t>4/19/2015</a:t>
             </a:fld>
             <a:endParaRPr lang="en-US"/>
           </a:p>
@@ -2650,7 +2651,7 @@
     </p:spTree>
     <p:extLst>
       <p:ext uri="{BB962C8B-B14F-4D97-AF65-F5344CB8AC3E}">
-        <p14:creationId xmlns:p14="http://schemas.microsoft.com/office/powerpoint/2010/main" val="677914939"/>
+        <p14:creationId xmlns:p14="http://schemas.microsoft.com/office/powerpoint/2010/main" val="3197012772"/>
       </p:ext>
     </p:extLst>
   </p:cSld>
@@ -2876,7 +2877,7 @@
           <a:p>
             <a:fld id="{A84E8D54-BAE0-4E27-8EE0-25F5D7DCDD5A}" type="datetimeFigureOut">
               <a:rPr lang="en-US" smtClean="0"/>
-              <a:t>4/17/2015</a:t>
+              <a:t>4/19/2015</a:t>
             </a:fld>
             <a:endParaRPr lang="en-US"/>
           </a:p>
@@ -2927,7 +2928,7 @@
     </p:spTree>
     <p:extLst>
       <p:ext uri="{BB962C8B-B14F-4D97-AF65-F5344CB8AC3E}">
-        <p14:creationId xmlns:p14="http://schemas.microsoft.com/office/powerpoint/2010/main" val="1500106416"/>
+        <p14:creationId xmlns:p14="http://schemas.microsoft.com/office/powerpoint/2010/main" val="294623011"/>
       </p:ext>
     </p:extLst>
   </p:cSld>
@@ -3129,7 +3130,7 @@
           <a:p>
             <a:fld id="{A84E8D54-BAE0-4E27-8EE0-25F5D7DCDD5A}" type="datetimeFigureOut">
               <a:rPr lang="en-US" smtClean="0"/>
-              <a:t>4/17/2015</a:t>
+              <a:t>4/19/2015</a:t>
             </a:fld>
             <a:endParaRPr lang="en-US"/>
           </a:p>
@@ -3180,7 +3181,7 @@
     </p:spTree>
     <p:extLst>
       <p:ext uri="{BB962C8B-B14F-4D97-AF65-F5344CB8AC3E}">
-        <p14:creationId xmlns:p14="http://schemas.microsoft.com/office/powerpoint/2010/main" val="482186087"/>
+        <p14:creationId xmlns:p14="http://schemas.microsoft.com/office/powerpoint/2010/main" val="2449676815"/>
       </p:ext>
     </p:extLst>
   </p:cSld>
@@ -3342,7 +3343,7 @@
           <a:p>
             <a:fld id="{A84E8D54-BAE0-4E27-8EE0-25F5D7DCDD5A}" type="datetimeFigureOut">
               <a:rPr lang="en-US" smtClean="0"/>
-              <a:t>4/17/2015</a:t>
+              <a:t>4/19/2015</a:t>
             </a:fld>
             <a:endParaRPr lang="en-US"/>
           </a:p>
@@ -3429,23 +3430,23 @@
     </p:spTree>
     <p:extLst>
       <p:ext uri="{BB962C8B-B14F-4D97-AF65-F5344CB8AC3E}">
-        <p14:creationId xmlns:p14="http://schemas.microsoft.com/office/powerpoint/2010/main" val="3538150306"/>
+        <p14:creationId xmlns:p14="http://schemas.microsoft.com/office/powerpoint/2010/main" val="4122189636"/>
       </p:ext>
     </p:extLst>
   </p:cSld>
   <p:clrMap bg1="lt1" tx1="dk1" bg2="lt2" tx2="dk2" accent1="accent1" accent2="accent2" accent3="accent3" accent4="accent4" accent5="accent5" accent6="accent6" hlink="hlink" folHlink="folHlink"/>
   <p:sldLayoutIdLst>
-    <p:sldLayoutId id="2147483649" r:id="rId1"/>
-    <p:sldLayoutId id="2147483650" r:id="rId2"/>
-    <p:sldLayoutId id="2147483651" r:id="rId3"/>
-    <p:sldLayoutId id="2147483652" r:id="rId4"/>
-    <p:sldLayoutId id="2147483653" r:id="rId5"/>
-    <p:sldLayoutId id="2147483654" r:id="rId6"/>
-    <p:sldLayoutId id="2147483655" r:id="rId7"/>
-    <p:sldLayoutId id="2147483656" r:id="rId8"/>
-    <p:sldLayoutId id="2147483657" r:id="rId9"/>
-    <p:sldLayoutId id="2147483658" r:id="rId10"/>
-    <p:sldLayoutId id="2147483659" r:id="rId11"/>
+    <p:sldLayoutId id="2147483816" r:id="rId1"/>
+    <p:sldLayoutId id="2147483817" r:id="rId2"/>
+    <p:sldLayoutId id="2147483818" r:id="rId3"/>
+    <p:sldLayoutId id="2147483819" r:id="rId4"/>
+    <p:sldLayoutId id="2147483820" r:id="rId5"/>
+    <p:sldLayoutId id="2147483821" r:id="rId6"/>
+    <p:sldLayoutId id="2147483822" r:id="rId7"/>
+    <p:sldLayoutId id="2147483823" r:id="rId8"/>
+    <p:sldLayoutId id="2147483824" r:id="rId9"/>
+    <p:sldLayoutId id="2147483825" r:id="rId10"/>
+    <p:sldLayoutId id="2147483826" r:id="rId11"/>
   </p:sldLayoutIdLst>
   <p:txStyles>
     <p:titleStyle>
@@ -3945,6 +3946,34 @@
           </a:p>
         </p:txBody>
       </p:sp>
+      <p:sp>
+        <p:nvSpPr>
+          <p:cNvPr id="5" name="Footer Placeholder 4"/>
+          <p:cNvSpPr>
+            <a:spLocks noGrp="1"/>
+          </p:cNvSpPr>
+          <p:nvPr>
+            <p:ph type="ftr" sz="quarter" idx="11"/>
+          </p:nvPr>
+        </p:nvSpPr>
+        <p:spPr>
+          <a:xfrm>
+            <a:off x="838200" y="6311900"/>
+            <a:ext cx="4984630" cy="365125"/>
+          </a:xfrm>
+        </p:spPr>
+        <p:txBody>
+          <a:bodyPr/>
+          <a:lstStyle/>
+          <a:p>
+            <a:r>
+              <a:rPr lang="en-US" dirty="0" smtClean="0"/>
+              <a:t>https://axispraxis.wordpress.com/2011/02/24/vision-the-master-metaphor/</a:t>
+            </a:r>
+            <a:endParaRPr lang="en-US" dirty="0"/>
+          </a:p>
+        </p:txBody>
+      </p:sp>
       <p:pic>
         <p:nvPicPr>
           <p:cNvPr id="4" name="Picture 3"/>
@@ -3969,34 +3998,6 @@
           </a:prstGeom>
         </p:spPr>
       </p:pic>
-      <p:sp>
-        <p:nvSpPr>
-          <p:cNvPr id="5" name="Footer Placeholder 4"/>
-          <p:cNvSpPr>
-            <a:spLocks noGrp="1"/>
-          </p:cNvSpPr>
-          <p:nvPr>
-            <p:ph type="ftr" sz="quarter" idx="11"/>
-          </p:nvPr>
-        </p:nvSpPr>
-        <p:spPr>
-          <a:xfrm>
-            <a:off x="838200" y="6311900"/>
-            <a:ext cx="4984630" cy="365125"/>
-          </a:xfrm>
-        </p:spPr>
-        <p:txBody>
-          <a:bodyPr/>
-          <a:lstStyle/>
-          <a:p>
-            <a:r>
-              <a:rPr lang="en-US" dirty="0" smtClean="0"/>
-              <a:t>https://axispraxis.wordpress.com/2011/02/24/vision-the-master-metaphor/</a:t>
-            </a:r>
-            <a:endParaRPr lang="en-US" dirty="0"/>
-          </a:p>
-        </p:txBody>
-      </p:sp>
     </p:spTree>
     <p:extLst>
       <p:ext uri="{BB962C8B-B14F-4D97-AF65-F5344CB8AC3E}">
@@ -4098,6 +4099,34 @@
           </a:p>
         </p:txBody>
       </p:sp>
+      <p:sp>
+        <p:nvSpPr>
+          <p:cNvPr id="7" name="Footer Placeholder 6"/>
+          <p:cNvSpPr>
+            <a:spLocks noGrp="1"/>
+          </p:cNvSpPr>
+          <p:nvPr>
+            <p:ph type="ftr" sz="quarter" idx="11"/>
+          </p:nvPr>
+        </p:nvSpPr>
+        <p:spPr>
+          <a:xfrm>
+            <a:off x="838200" y="6311900"/>
+            <a:ext cx="4674079" cy="365125"/>
+          </a:xfrm>
+        </p:spPr>
+        <p:txBody>
+          <a:bodyPr/>
+          <a:lstStyle/>
+          <a:p>
+            <a:r>
+              <a:rPr lang="en-US" dirty="0" smtClean="0"/>
+              <a:t>http://commons.wikimedia.org/wiki/File:Spektrum_spojite_carove.png</a:t>
+            </a:r>
+            <a:endParaRPr lang="en-US" dirty="0"/>
+          </a:p>
+        </p:txBody>
+      </p:sp>
       <p:pic>
         <p:nvPicPr>
           <p:cNvPr id="6" name="Picture 5"/>
@@ -4121,34 +4150,6 @@
           </a:prstGeom>
         </p:spPr>
       </p:pic>
-      <p:sp>
-        <p:nvSpPr>
-          <p:cNvPr id="7" name="Footer Placeholder 6"/>
-          <p:cNvSpPr>
-            <a:spLocks noGrp="1"/>
-          </p:cNvSpPr>
-          <p:nvPr>
-            <p:ph type="ftr" sz="quarter" idx="11"/>
-          </p:nvPr>
-        </p:nvSpPr>
-        <p:spPr>
-          <a:xfrm>
-            <a:off x="838200" y="6311900"/>
-            <a:ext cx="4674079" cy="365125"/>
-          </a:xfrm>
-        </p:spPr>
-        <p:txBody>
-          <a:bodyPr/>
-          <a:lstStyle/>
-          <a:p>
-            <a:r>
-              <a:rPr lang="en-US" dirty="0" smtClean="0"/>
-              <a:t>http://commons.wikimedia.org/wiki/File:Spektrum_spojite_carove.png</a:t>
-            </a:r>
-            <a:endParaRPr lang="en-US" dirty="0"/>
-          </a:p>
-        </p:txBody>
-      </p:sp>
     </p:spTree>
     <p:extLst>
       <p:ext uri="{BB962C8B-B14F-4D97-AF65-F5344CB8AC3E}">
@@ -4245,6 +4246,34 @@
             <a:r>
               <a:rPr lang="sk-SK" dirty="0" smtClean="0"/>
               <a:t>Absorpčné</a:t>
+            </a:r>
+            <a:endParaRPr lang="en-US" dirty="0"/>
+          </a:p>
+        </p:txBody>
+      </p:sp>
+      <p:sp>
+        <p:nvSpPr>
+          <p:cNvPr id="6" name="Footer Placeholder 5"/>
+          <p:cNvSpPr>
+            <a:spLocks noGrp="1"/>
+          </p:cNvSpPr>
+          <p:nvPr>
+            <p:ph type="ftr" sz="quarter" idx="11"/>
+          </p:nvPr>
+        </p:nvSpPr>
+        <p:spPr>
+          <a:xfrm>
+            <a:off x="838200" y="6292282"/>
+            <a:ext cx="3475008" cy="365125"/>
+          </a:xfrm>
+        </p:spPr>
+        <p:txBody>
+          <a:bodyPr/>
+          <a:lstStyle/>
+          <a:p>
+            <a:r>
+              <a:rPr lang="en-US" dirty="0" smtClean="0"/>
+              <a:t>https://www.youtube.com/watch?v=6IMJglnz2Uw</a:t>
             </a:r>
             <a:endParaRPr lang="en-US" dirty="0"/>
           </a:p>
@@ -4328,34 +4357,6 @@
           </a:extLst>
         </p:spPr>
       </p:pic>
-      <p:sp>
-        <p:nvSpPr>
-          <p:cNvPr id="6" name="Footer Placeholder 5"/>
-          <p:cNvSpPr>
-            <a:spLocks noGrp="1"/>
-          </p:cNvSpPr>
-          <p:nvPr>
-            <p:ph type="ftr" sz="quarter" idx="11"/>
-          </p:nvPr>
-        </p:nvSpPr>
-        <p:spPr>
-          <a:xfrm>
-            <a:off x="838200" y="6292282"/>
-            <a:ext cx="3475008" cy="365125"/>
-          </a:xfrm>
-        </p:spPr>
-        <p:txBody>
-          <a:bodyPr/>
-          <a:lstStyle/>
-          <a:p>
-            <a:r>
-              <a:rPr lang="en-US" dirty="0" smtClean="0"/>
-              <a:t>https://www.youtube.com/watch?v=6IMJglnz2Uw</a:t>
-            </a:r>
-            <a:endParaRPr lang="en-US" dirty="0"/>
-          </a:p>
-        </p:txBody>
-      </p:sp>
     </p:spTree>
     <p:extLst>
       <p:ext uri="{BB962C8B-B14F-4D97-AF65-F5344CB8AC3E}">
@@ -4452,6 +4453,34 @@
             <a:r>
               <a:rPr lang="sk-SK" dirty="0" smtClean="0"/>
               <a:t>Interferenčný</a:t>
+            </a:r>
+            <a:endParaRPr lang="en-US" dirty="0"/>
+          </a:p>
+        </p:txBody>
+      </p:sp>
+      <p:sp>
+        <p:nvSpPr>
+          <p:cNvPr id="4" name="Footer Placeholder 3"/>
+          <p:cNvSpPr>
+            <a:spLocks noGrp="1"/>
+          </p:cNvSpPr>
+          <p:nvPr>
+            <p:ph type="ftr" sz="quarter" idx="11"/>
+          </p:nvPr>
+        </p:nvSpPr>
+        <p:spPr>
+          <a:xfrm>
+            <a:off x="838200" y="6390856"/>
+            <a:ext cx="6893943" cy="365125"/>
+          </a:xfrm>
+        </p:spPr>
+        <p:txBody>
+          <a:bodyPr/>
+          <a:lstStyle/>
+          <a:p>
+            <a:r>
+              <a:rPr lang="en-US" dirty="0" smtClean="0"/>
+              <a:t>http://en.wikipedia.org/wiki/Diffraction_grating#/media/File:Comparison_refraction_diffraction_spectra.svg</a:t>
             </a:r>
             <a:endParaRPr lang="en-US" dirty="0"/>
           </a:p>
@@ -4498,34 +4527,6 @@
           </a:extLst>
         </p:spPr>
       </p:pic>
-      <p:sp>
-        <p:nvSpPr>
-          <p:cNvPr id="4" name="Footer Placeholder 3"/>
-          <p:cNvSpPr>
-            <a:spLocks noGrp="1"/>
-          </p:cNvSpPr>
-          <p:nvPr>
-            <p:ph type="ftr" sz="quarter" idx="11"/>
-          </p:nvPr>
-        </p:nvSpPr>
-        <p:spPr>
-          <a:xfrm>
-            <a:off x="838200" y="6390856"/>
-            <a:ext cx="6893943" cy="365125"/>
-          </a:xfrm>
-        </p:spPr>
-        <p:txBody>
-          <a:bodyPr/>
-          <a:lstStyle/>
-          <a:p>
-            <a:r>
-              <a:rPr lang="en-US" dirty="0" smtClean="0"/>
-              <a:t>http://en.wikipedia.org/wiki/Diffraction_grating#/media/File:Comparison_refraction_diffraction_spectra.svg</a:t>
-            </a:r>
-            <a:endParaRPr lang="en-US" dirty="0"/>
-          </a:p>
-        </p:txBody>
-      </p:sp>
     </p:spTree>
     <p:extLst>
       <p:ext uri="{BB962C8B-B14F-4D97-AF65-F5344CB8AC3E}">
@@ -4579,6 +4580,281 @@
           <a:lstStyle/>
           <a:p>
             <a:r>
+              <a:rPr lang="en-US" dirty="0" err="1" smtClean="0"/>
+              <a:t>Hranolov</a:t>
+            </a:r>
+            <a:r>
+              <a:rPr lang="sk-SK" dirty="0" smtClean="0"/>
+              <a:t>ý spektroskop</a:t>
+            </a:r>
+            <a:endParaRPr lang="en-US" dirty="0"/>
+          </a:p>
+        </p:txBody>
+      </p:sp>
+      <mc:AlternateContent xmlns:mc="http://schemas.openxmlformats.org/markup-compatibility/2006">
+        <mc:Choice xmlns:a14="http://schemas.microsoft.com/office/drawing/2010/main" Requires="a14">
+          <p:sp>
+            <p:nvSpPr>
+              <p:cNvPr id="3" name="Content Placeholder 2"/>
+              <p:cNvSpPr>
+                <a:spLocks noGrp="1"/>
+              </p:cNvSpPr>
+              <p:nvPr>
+                <p:ph idx="1"/>
+              </p:nvPr>
+            </p:nvSpPr>
+            <p:spPr/>
+            <p:txBody>
+              <a:bodyPr/>
+              <a:lstStyle/>
+              <a:p>
+                <a:r>
+                  <a:rPr lang="sk-SK" dirty="0" smtClean="0"/>
+                  <a:t>Lom svetla</a:t>
+                </a:r>
+              </a:p>
+              <a:p>
+                <a14:m>
+                  <m:oMath xmlns:m="http://schemas.openxmlformats.org/officeDocument/2006/math">
+                    <m:f>
+                      <m:fPr>
+                        <m:ctrlPr>
+                          <a:rPr lang="en-US" i="1"/>
+                        </m:ctrlPr>
+                      </m:fPr>
+                      <m:num>
+                        <m:r>
+                          <a:rPr lang="cs-CZ" i="1"/>
+                          <m:t>𝜕𝛿</m:t>
+                        </m:r>
+                      </m:num>
+                      <m:den>
+                        <m:r>
+                          <a:rPr lang="cs-CZ" i="1"/>
+                          <m:t>𝜕𝜆</m:t>
+                        </m:r>
+                      </m:den>
+                    </m:f>
+                    <m:r>
+                      <a:rPr lang="cs-CZ" i="1"/>
+                      <m:t>=2</m:t>
+                    </m:r>
+                    <m:f>
+                      <m:fPr>
+                        <m:ctrlPr>
+                          <a:rPr lang="en-US" i="1"/>
+                        </m:ctrlPr>
+                      </m:fPr>
+                      <m:num>
+                        <m:r>
+                          <a:rPr lang="cs-CZ" i="1"/>
+                          <m:t>𝜕</m:t>
+                        </m:r>
+                        <m:r>
+                          <a:rPr lang="cs-CZ" i="1"/>
+                          <m:t>𝑛</m:t>
+                        </m:r>
+                      </m:num>
+                      <m:den>
+                        <m:r>
+                          <a:rPr lang="cs-CZ" i="1"/>
+                          <m:t>𝜕𝜆</m:t>
+                        </m:r>
+                      </m:den>
+                    </m:f>
+                    <m:f>
+                      <m:fPr>
+                        <m:ctrlPr>
+                          <a:rPr lang="en-US" i="1"/>
+                        </m:ctrlPr>
+                      </m:fPr>
+                      <m:num>
+                        <m:r>
+                          <m:rPr>
+                            <m:sty m:val="p"/>
+                          </m:rPr>
+                          <a:rPr lang="cs-CZ"/>
+                          <m:t>sin</m:t>
+                        </m:r>
+                        <m:r>
+                          <a:rPr lang="cs-CZ" i="1"/>
+                          <m:t>(</m:t>
+                        </m:r>
+                        <m:f>
+                          <m:fPr>
+                            <m:type m:val="lin"/>
+                            <m:ctrlPr>
+                              <a:rPr lang="en-US" i="1"/>
+                            </m:ctrlPr>
+                          </m:fPr>
+                          <m:num>
+                            <m:r>
+                              <a:rPr lang="cs-CZ" i="1"/>
+                              <m:t>𝜑</m:t>
+                            </m:r>
+                          </m:num>
+                          <m:den>
+                            <m:r>
+                              <a:rPr lang="cs-CZ" i="1"/>
+                              <m:t>2</m:t>
+                            </m:r>
+                          </m:den>
+                        </m:f>
+                        <m:r>
+                          <a:rPr lang="cs-CZ" i="1"/>
+                          <m:t>)</m:t>
+                        </m:r>
+                      </m:num>
+                      <m:den>
+                        <m:r>
+                          <m:rPr>
+                            <m:sty m:val="p"/>
+                          </m:rPr>
+                          <a:rPr lang="cs-CZ"/>
+                          <m:t>cos</m:t>
+                        </m:r>
+                        <m:r>
+                          <a:rPr lang="cs-CZ" i="1"/>
+                          <m:t>(</m:t>
+                        </m:r>
+                        <m:r>
+                          <a:rPr lang="cs-CZ" i="1"/>
+                          <m:t>𝛿</m:t>
+                        </m:r>
+                        <m:r>
+                          <a:rPr lang="cs-CZ" i="1"/>
+                          <m:t>+</m:t>
+                        </m:r>
+                        <m:r>
+                          <a:rPr lang="cs-CZ" i="1"/>
+                          <m:t>𝜑</m:t>
+                        </m:r>
+                        <m:r>
+                          <a:rPr lang="cs-CZ" i="1"/>
+                          <m:t>)</m:t>
+                        </m:r>
+                      </m:den>
+                    </m:f>
+                  </m:oMath>
+                </a14:m>
+                <a:endParaRPr lang="en-US" dirty="0"/>
+              </a:p>
+              <a:p>
+                <a:endParaRPr lang="en-US" dirty="0"/>
+              </a:p>
+            </p:txBody>
+          </p:sp>
+        </mc:Choice>
+        <mc:Fallback>
+          <p:sp>
+            <p:nvSpPr>
+              <p:cNvPr id="3" name="Content Placeholder 2"/>
+              <p:cNvSpPr>
+                <a:spLocks noGrp="1" noRot="1" noChangeAspect="1" noMove="1" noResize="1" noEditPoints="1" noAdjustHandles="1" noChangeArrowheads="1" noChangeShapeType="1" noTextEdit="1"/>
+              </p:cNvSpPr>
+              <p:nvPr>
+                <p:ph idx="1"/>
+              </p:nvPr>
+            </p:nvSpPr>
+            <p:spPr>
+              <a:blipFill rotWithShape="0">
+                <a:blip r:embed="rId2"/>
+                <a:stretch>
+                  <a:fillRect l="-1043" t="-2241"/>
+                </a:stretch>
+              </a:blipFill>
+            </p:spPr>
+            <p:txBody>
+              <a:bodyPr/>
+              <a:lstStyle/>
+              <a:p>
+                <a:r>
+                  <a:rPr lang="en-US">
+                    <a:noFill/>
+                  </a:rPr>
+                  <a:t> </a:t>
+                </a:r>
+              </a:p>
+            </p:txBody>
+          </p:sp>
+        </mc:Fallback>
+      </mc:AlternateContent>
+      <p:pic>
+        <p:nvPicPr>
+          <p:cNvPr id="6" name="obrázky6"/>
+          <p:cNvPicPr/>
+          <p:nvPr/>
+        </p:nvPicPr>
+        <p:blipFill>
+          <a:blip r:embed="rId3">
+            <a:lum bright="-50000"/>
+            <a:alphaModFix/>
+          </a:blip>
+          <a:srcRect/>
+          <a:stretch>
+            <a:fillRect/>
+          </a:stretch>
+        </p:blipFill>
+        <p:spPr>
+          <a:xfrm>
+            <a:off x="6636038" y="1919866"/>
+            <a:ext cx="4124326" cy="3132425"/>
+          </a:xfrm>
+          <a:prstGeom prst="rect">
+            <a:avLst/>
+          </a:prstGeom>
+          <a:ln>
+            <a:noFill/>
+            <a:prstDash/>
+          </a:ln>
+        </p:spPr>
+      </p:pic>
+    </p:spTree>
+    <p:extLst>
+      <p:ext uri="{BB962C8B-B14F-4D97-AF65-F5344CB8AC3E}">
+        <p14:creationId xmlns:p14="http://schemas.microsoft.com/office/powerpoint/2010/main" val="1602531603"/>
+      </p:ext>
+    </p:extLst>
+  </p:cSld>
+  <p:clrMapOvr>
+    <a:masterClrMapping/>
+  </p:clrMapOvr>
+</p:sld>
+</file>
+
+<file path=ppt/slides/slide7.xml><?xml version="1.0" encoding="utf-8"?>
+<p:sld xmlns:a="http://schemas.openxmlformats.org/drawingml/2006/main" xmlns:r="http://schemas.openxmlformats.org/officeDocument/2006/relationships" xmlns:p="http://schemas.openxmlformats.org/presentationml/2006/main">
+  <p:cSld>
+    <p:spTree>
+      <p:nvGrpSpPr>
+        <p:cNvPr id="1" name=""/>
+        <p:cNvGrpSpPr/>
+        <p:nvPr/>
+      </p:nvGrpSpPr>
+      <p:grpSpPr>
+        <a:xfrm>
+          <a:off x="0" y="0"/>
+          <a:ext cx="0" cy="0"/>
+          <a:chOff x="0" y="0"/>
+          <a:chExt cx="0" cy="0"/>
+        </a:xfrm>
+      </p:grpSpPr>
+      <p:sp>
+        <p:nvSpPr>
+          <p:cNvPr id="2" name="Title 1"/>
+          <p:cNvSpPr>
+            <a:spLocks noGrp="1"/>
+          </p:cNvSpPr>
+          <p:nvPr>
+            <p:ph type="title"/>
+          </p:nvPr>
+        </p:nvSpPr>
+        <p:spPr/>
+        <p:txBody>
+          <a:bodyPr/>
+          <a:lstStyle/>
+          <a:p>
+            <a:r>
               <a:rPr lang="sk-SK" dirty="0" smtClean="0"/>
               <a:t>Barevné souradnice</a:t>
             </a:r>
@@ -4647,6 +4923,61 @@
               <a:t>CMYK</a:t>
             </a:r>
             <a:endParaRPr lang="en-US" dirty="0"/>
+          </a:p>
+        </p:txBody>
+      </p:sp>
+      <p:sp>
+        <p:nvSpPr>
+          <p:cNvPr id="6" name="Footer Placeholder 5"/>
+          <p:cNvSpPr>
+            <a:spLocks noGrp="1"/>
+          </p:cNvSpPr>
+          <p:nvPr>
+            <p:ph type="ftr" sz="quarter" idx="11"/>
+          </p:nvPr>
+        </p:nvSpPr>
+        <p:spPr>
+          <a:xfrm>
+            <a:off x="838199" y="6176963"/>
+            <a:ext cx="3638909" cy="365125"/>
+          </a:xfrm>
+        </p:spPr>
+        <p:txBody>
+          <a:bodyPr/>
+          <a:lstStyle/>
+          <a:p>
+            <a:r>
+              <a:rPr lang="en-US" dirty="0"/>
+              <a:t>http://</a:t>
+            </a:r>
+            <a:r>
+              <a:rPr lang="en-US" dirty="0" smtClean="0"/>
+              <a:t>en.wikipedia.org/wiki/CIE_1931_color_space</a:t>
+            </a:r>
+            <a:r>
+              <a:rPr lang="sk-SK" dirty="0" smtClean="0"/>
+              <a:t> </a:t>
+            </a:r>
+          </a:p>
+          <a:p>
+            <a:r>
+              <a:rPr lang="en-US" dirty="0"/>
+              <a:t>http://</a:t>
+            </a:r>
+            <a:r>
+              <a:rPr lang="en-US" dirty="0" smtClean="0"/>
+              <a:t>www.wisotop.de/hsv-und-hsl-farbmodell.shtml</a:t>
+            </a:r>
+            <a:r>
+              <a:rPr lang="sk-SK" dirty="0" smtClean="0"/>
+              <a:t>  </a:t>
+            </a:r>
+          </a:p>
+          <a:p>
+            <a:r>
+              <a:rPr lang="en-US" dirty="0"/>
+              <a:t>http://blog.thepapermillstore.com/cmyk-vs-rgb-color</a:t>
+            </a:r>
           </a:p>
         </p:txBody>
       </p:sp>
@@ -4691,62 +5022,6 @@
           </a:extLst>
         </p:spPr>
       </p:pic>
-      <p:sp>
-        <p:nvSpPr>
-          <p:cNvPr id="6" name="Footer Placeholder 5"/>
-          <p:cNvSpPr>
-            <a:spLocks noGrp="1"/>
-          </p:cNvSpPr>
-          <p:nvPr>
-            <p:ph type="ftr" sz="quarter" idx="11"/>
-          </p:nvPr>
-        </p:nvSpPr>
-        <p:spPr>
-          <a:xfrm>
-            <a:off x="838199" y="6176963"/>
-            <a:ext cx="3638909" cy="365125"/>
-          </a:xfrm>
-        </p:spPr>
-        <p:txBody>
-          <a:bodyPr/>
-          <a:lstStyle/>
-          <a:p>
-            <a:r>
-              <a:rPr lang="en-US" dirty="0"/>
-              <a:t>http://</a:t>
-            </a:r>
-            <a:r>
-              <a:rPr lang="en-US" dirty="0" smtClean="0"/>
-              <a:t>en.wikipedia.org/wiki/CIE_1931_color_space</a:t>
-            </a:r>
-            <a:r>
-              <a:rPr lang="sk-SK" dirty="0" smtClean="0"/>
-              <a:t> </a:t>
-            </a:r>
-          </a:p>
-          <a:p>
-            <a:r>
-              <a:rPr lang="en-US" dirty="0"/>
-              <a:t>http://</a:t>
-            </a:r>
-            <a:r>
-              <a:rPr lang="en-US" dirty="0" smtClean="0"/>
-              <a:t>www.wisotop.de/hsv-und-hsl-farbmodell.shtml</a:t>
-            </a:r>
-            <a:r>
-              <a:rPr lang="sk-SK" dirty="0" smtClean="0"/>
-              <a:t>  </a:t>
-            </a:r>
-          </a:p>
-          <a:p>
-            <a:r>
-              <a:rPr lang="en-US" dirty="0"/>
-              <a:t>http://blog.thepapermillstore.com/cmyk-vs-rgb-color</a:t>
-            </a:r>
-            <a:endParaRPr lang="en-US" dirty="0"/>
-          </a:p>
-        </p:txBody>
-      </p:sp>
       <p:pic>
         <p:nvPicPr>
           <p:cNvPr id="5126" name="Picture 6" descr="http://www.wisotop.de/assets/farbmodelle-hsv-hsl-zylinder.png"/>

</xml_diff>